<commit_message>
Update ex fig 3
</commit_message>
<xml_diff>
--- a/figures/Ex Fig 3.pptx
+++ b/figures/Ex Fig 3.pptx
@@ -197,7 +197,7 @@
           <a:p>
             <a:fld id="{B19977C2-3852-6343-8FB6-75798599EF47}" type="datetimeFigureOut">
               <a:rPr lang="en-US" smtClean="0"/>
-              <a:t>9/5/24</a:t>
+              <a:t>9/6/24</a:t>
             </a:fld>
             <a:endParaRPr lang="en-US"/>
           </a:p>
@@ -684,7 +684,7 @@
           <a:p>
             <a:fld id="{49D16157-31ED-214D-A6E8-583A2FDE31BF}" type="datetimeFigureOut">
               <a:rPr lang="en-US" smtClean="0"/>
-              <a:t>9/5/24</a:t>
+              <a:t>9/6/24</a:t>
             </a:fld>
             <a:endParaRPr lang="en-US"/>
           </a:p>
@@ -854,7 +854,7 @@
           <a:p>
             <a:fld id="{49D16157-31ED-214D-A6E8-583A2FDE31BF}" type="datetimeFigureOut">
               <a:rPr lang="en-US" smtClean="0"/>
-              <a:t>9/5/24</a:t>
+              <a:t>9/6/24</a:t>
             </a:fld>
             <a:endParaRPr lang="en-US"/>
           </a:p>
@@ -1034,7 +1034,7 @@
           <a:p>
             <a:fld id="{49D16157-31ED-214D-A6E8-583A2FDE31BF}" type="datetimeFigureOut">
               <a:rPr lang="en-US" smtClean="0"/>
-              <a:t>9/5/24</a:t>
+              <a:t>9/6/24</a:t>
             </a:fld>
             <a:endParaRPr lang="en-US"/>
           </a:p>
@@ -1204,7 +1204,7 @@
           <a:p>
             <a:fld id="{49D16157-31ED-214D-A6E8-583A2FDE31BF}" type="datetimeFigureOut">
               <a:rPr lang="en-US" smtClean="0"/>
-              <a:t>9/5/24</a:t>
+              <a:t>9/6/24</a:t>
             </a:fld>
             <a:endParaRPr lang="en-US"/>
           </a:p>
@@ -1450,7 +1450,7 @@
           <a:p>
             <a:fld id="{49D16157-31ED-214D-A6E8-583A2FDE31BF}" type="datetimeFigureOut">
               <a:rPr lang="en-US" smtClean="0"/>
-              <a:t>9/5/24</a:t>
+              <a:t>9/6/24</a:t>
             </a:fld>
             <a:endParaRPr lang="en-US"/>
           </a:p>
@@ -1682,7 +1682,7 @@
           <a:p>
             <a:fld id="{49D16157-31ED-214D-A6E8-583A2FDE31BF}" type="datetimeFigureOut">
               <a:rPr lang="en-US" smtClean="0"/>
-              <a:t>9/5/24</a:t>
+              <a:t>9/6/24</a:t>
             </a:fld>
             <a:endParaRPr lang="en-US"/>
           </a:p>
@@ -2049,7 +2049,7 @@
           <a:p>
             <a:fld id="{49D16157-31ED-214D-A6E8-583A2FDE31BF}" type="datetimeFigureOut">
               <a:rPr lang="en-US" smtClean="0"/>
-              <a:t>9/5/24</a:t>
+              <a:t>9/6/24</a:t>
             </a:fld>
             <a:endParaRPr lang="en-US"/>
           </a:p>
@@ -2167,7 +2167,7 @@
           <a:p>
             <a:fld id="{49D16157-31ED-214D-A6E8-583A2FDE31BF}" type="datetimeFigureOut">
               <a:rPr lang="en-US" smtClean="0"/>
-              <a:t>9/5/24</a:t>
+              <a:t>9/6/24</a:t>
             </a:fld>
             <a:endParaRPr lang="en-US"/>
           </a:p>
@@ -2262,7 +2262,7 @@
           <a:p>
             <a:fld id="{49D16157-31ED-214D-A6E8-583A2FDE31BF}" type="datetimeFigureOut">
               <a:rPr lang="en-US" smtClean="0"/>
-              <a:t>9/5/24</a:t>
+              <a:t>9/6/24</a:t>
             </a:fld>
             <a:endParaRPr lang="en-US"/>
           </a:p>
@@ -2539,7 +2539,7 @@
           <a:p>
             <a:fld id="{49D16157-31ED-214D-A6E8-583A2FDE31BF}" type="datetimeFigureOut">
               <a:rPr lang="en-US" smtClean="0"/>
-              <a:t>9/5/24</a:t>
+              <a:t>9/6/24</a:t>
             </a:fld>
             <a:endParaRPr lang="en-US"/>
           </a:p>
@@ -2796,7 +2796,7 @@
           <a:p>
             <a:fld id="{49D16157-31ED-214D-A6E8-583A2FDE31BF}" type="datetimeFigureOut">
               <a:rPr lang="en-US" smtClean="0"/>
-              <a:t>9/5/24</a:t>
+              <a:t>9/6/24</a:t>
             </a:fld>
             <a:endParaRPr lang="en-US"/>
           </a:p>
@@ -3009,7 +3009,7 @@
           <a:p>
             <a:fld id="{49D16157-31ED-214D-A6E8-583A2FDE31BF}" type="datetimeFigureOut">
               <a:rPr lang="en-US" smtClean="0"/>
-              <a:t>9/5/24</a:t>
+              <a:t>9/6/24</a:t>
             </a:fld>
             <a:endParaRPr lang="en-US"/>
           </a:p>
@@ -3435,7 +3435,7 @@
         </p:blipFill>
         <p:spPr>
           <a:xfrm>
-            <a:off x="2769926" y="1727760"/>
+            <a:off x="2758203" y="1727760"/>
             <a:ext cx="8640000" cy="2880000"/>
           </a:xfrm>
           <a:prstGeom prst="rect">
@@ -5886,7 +5886,7 @@
         </p:nvSpPr>
         <p:spPr>
           <a:xfrm>
-            <a:off x="5802213" y="1615858"/>
+            <a:off x="5825659" y="1615858"/>
             <a:ext cx="255199" cy="246221"/>
           </a:xfrm>
           <a:prstGeom prst="rect">
@@ -5928,7 +5928,7 @@
         </p:nvSpPr>
         <p:spPr>
           <a:xfrm>
-            <a:off x="7177555" y="1615858"/>
+            <a:off x="7212724" y="1615858"/>
             <a:ext cx="263214" cy="246221"/>
           </a:xfrm>
           <a:prstGeom prst="rect">

</xml_diff>